<commit_message>
California with UC turned on
</commit_message>
<xml_diff>
--- a/Reduced/progress.pptx
+++ b/Reduced/progress.pptx
@@ -6,6 +6,7 @@
   </p:sldMasterIdLst>
   <p:sldIdLst>
     <p:sldId id="256" r:id="rId2"/>
+    <p:sldId id="257" r:id="rId3"/>
   </p:sldIdLst>
   <p:sldSz cx="12192000" cy="6858000"/>
   <p:notesSz cx="6858000" cy="9144000"/>
@@ -104,6 +105,11 @@
       </a:defRPr>
     </a:lvl9pPr>
   </p:defaultTextStyle>
+  <p:extLst>
+    <p:ext uri="{EFAFB233-063F-42B5-8137-9DF3F51BA10A}">
+      <p15:sldGuideLst xmlns:p15="http://schemas.microsoft.com/office/powerpoint/2012/main"/>
+    </p:ext>
+  </p:extLst>
 </p:presentation>
 </file>
 
@@ -4567,6 +4573,98 @@
     <p:extLst>
       <p:ext uri="{BB962C8B-B14F-4D97-AF65-F5344CB8AC3E}">
         <p14:creationId xmlns:p14="http://schemas.microsoft.com/office/powerpoint/2010/main" val="3456708456"/>
+      </p:ext>
+    </p:extLst>
+  </p:cSld>
+  <p:clrMapOvr>
+    <a:masterClrMapping/>
+  </p:clrMapOvr>
+</p:sld>
+</file>
+
+<file path=ppt/slides/slide2.xml><?xml version="1.0" encoding="utf-8"?>
+<p:sld xmlns:a="http://schemas.openxmlformats.org/drawingml/2006/main" xmlns:r="http://schemas.openxmlformats.org/officeDocument/2006/relationships" xmlns:p="http://schemas.openxmlformats.org/presentationml/2006/main">
+  <p:cSld>
+    <p:spTree>
+      <p:nvGrpSpPr>
+        <p:cNvPr id="1" name=""/>
+        <p:cNvGrpSpPr/>
+        <p:nvPr/>
+      </p:nvGrpSpPr>
+      <p:grpSpPr>
+        <a:xfrm>
+          <a:off x="0" y="0"/>
+          <a:ext cx="0" cy="0"/>
+          <a:chOff x="0" y="0"/>
+          <a:chExt cx="0" cy="0"/>
+        </a:xfrm>
+      </p:grpSpPr>
+      <p:sp>
+        <p:nvSpPr>
+          <p:cNvPr id="2" name="TextBox 1"/>
+          <p:cNvSpPr txBox="1"/>
+          <p:nvPr/>
+        </p:nvSpPr>
+        <p:spPr>
+          <a:xfrm>
+            <a:off x="589935" y="747252"/>
+            <a:ext cx="5586337" cy="1477328"/>
+          </a:xfrm>
+          <a:prstGeom prst="rect">
+            <a:avLst/>
+          </a:prstGeom>
+          <a:noFill/>
+        </p:spPr>
+        <p:txBody>
+          <a:bodyPr wrap="none" rtlCol="0">
+            <a:spAutoFit/>
+          </a:bodyPr>
+          <a:lstStyle/>
+          <a:p>
+            <a:r>
+              <a:rPr lang="en-US" dirty="0" smtClean="0"/>
+              <a:t>Key assumptions:</a:t>
+            </a:r>
+          </a:p>
+          <a:p>
+            <a:endParaRPr lang="en-US" dirty="0"/>
+          </a:p>
+          <a:p>
+            <a:pPr marL="285750" indent="-285750">
+              <a:buFontTx/>
+              <a:buChar char="-"/>
+            </a:pPr>
+            <a:r>
+              <a:rPr lang="en-US" dirty="0" smtClean="0"/>
+              <a:t>Transmission line limits relaxed in some cases</a:t>
+            </a:r>
+          </a:p>
+          <a:p>
+            <a:pPr marL="285750" indent="-285750">
+              <a:buFontTx/>
+              <a:buChar char="-"/>
+            </a:pPr>
+            <a:r>
+              <a:rPr lang="en-US" dirty="0" smtClean="0"/>
+              <a:t>Generator maximum constraints relaxed in some cases</a:t>
+            </a:r>
+          </a:p>
+          <a:p>
+            <a:pPr marL="742950" lvl="1" indent="-285750">
+              <a:buFontTx/>
+              <a:buChar char="-"/>
+            </a:pPr>
+            <a:r>
+              <a:rPr lang="en-US" dirty="0"/>
+              <a:t>ELCAJN_7_GT1</a:t>
+            </a:r>
+          </a:p>
+        </p:txBody>
+      </p:sp>
+    </p:spTree>
+    <p:extLst>
+      <p:ext uri="{BB962C8B-B14F-4D97-AF65-F5344CB8AC3E}">
+        <p14:creationId xmlns:p14="http://schemas.microsoft.com/office/powerpoint/2010/main" val="2714439611"/>
       </p:ext>
     </p:extLst>
   </p:cSld>

</xml_diff>